<commit_message>
Added search cases using generalized BWT, using Siren's paper example
</commit_message>
<xml_diff>
--- a/hisat2_test/GCSA_paper_example.pptx
+++ b/hisat2_test/GCSA_paper_example.pptx
@@ -5,7 +5,7 @@
     <p:sldMasterId id="2147483648" r:id="rId1"/>
   </p:sldMasterIdLst>
   <p:sldIdLst>
-    <p:sldId id="257" r:id="rId2"/>
+    <p:sldId id="259" r:id="rId2"/>
     <p:sldId id="258" r:id="rId3"/>
   </p:sldIdLst>
   <p:sldSz cx="9144000" cy="6858000" type="screen4x3"/>
@@ -7996,13 +7996,13 @@
           <p:nvPr>
             <p:extLst>
               <p:ext uri="{D42A27DB-BD31-4B8C-83A1-F6EECF244321}">
-                <p14:modId xmlns:p14="http://schemas.microsoft.com/office/powerpoint/2010/main" val="38291511"/>
+                <p14:modId xmlns:p14="http://schemas.microsoft.com/office/powerpoint/2010/main" val="205539274"/>
               </p:ext>
             </p:extLst>
           </p:nvPr>
         </p:nvGraphicFramePr>
         <p:xfrm>
-          <a:off x="792243" y="3120539"/>
+          <a:off x="792243" y="3070934"/>
           <a:ext cx="7668368" cy="1630679"/>
         </p:xfrm>
         <a:graphic>
@@ -10990,14 +10990,14 @@
           <p:nvPr>
             <p:extLst>
               <p:ext uri="{D42A27DB-BD31-4B8C-83A1-F6EECF244321}">
-                <p14:modId xmlns:p14="http://schemas.microsoft.com/office/powerpoint/2010/main" val="3423804932"/>
+                <p14:modId xmlns:p14="http://schemas.microsoft.com/office/powerpoint/2010/main" val="3365045547"/>
               </p:ext>
             </p:extLst>
           </p:nvPr>
         </p:nvGraphicFramePr>
         <p:xfrm>
-          <a:off x="787950" y="4996562"/>
-          <a:ext cx="7189095" cy="1630679"/>
+          <a:off x="787950" y="4837826"/>
+          <a:ext cx="7189095" cy="2001519"/>
         </p:xfrm>
         <a:graphic>
           <a:graphicData uri="http://schemas.openxmlformats.org/drawingml/2006/table">
@@ -12759,7 +12759,7 @@
                       <a:pPr algn="ctr"/>
                       <a:r>
                         <a:rPr lang="en-US" sz="1400" dirty="0" smtClean="0"/>
-                        <a:t>M</a:t>
+                        <a:t>F</a:t>
                       </a:r>
                       <a:endParaRPr lang="en-US" sz="1400" dirty="0"/>
                     </a:p>
@@ -12895,7 +12895,7 @@
                       <a:pPr algn="ctr"/>
                       <a:r>
                         <a:rPr lang="en-US" sz="1400" dirty="0" smtClean="0"/>
-                        <a:t>10</a:t>
+                        <a:t>1</a:t>
                       </a:r>
                       <a:endParaRPr lang="en-US" sz="1400" dirty="0"/>
                     </a:p>
@@ -12997,7 +12997,7 @@
                       <a:pPr algn="ctr"/>
                       <a:r>
                         <a:rPr lang="en-US" sz="1400" dirty="0" smtClean="0"/>
-                        <a:t>10</a:t>
+                        <a:t>1</a:t>
                       </a:r>
                       <a:endParaRPr lang="en-US" sz="1400" dirty="0"/>
                     </a:p>
@@ -13031,7 +13031,7 @@
                       <a:pPr algn="ctr"/>
                       <a:r>
                         <a:rPr lang="en-US" sz="1400" dirty="0" smtClean="0"/>
-                        <a:t>1</a:t>
+                        <a:t>10</a:t>
                       </a:r>
                       <a:endParaRPr lang="en-US" sz="1400" dirty="0"/>
                     </a:p>
@@ -13064,7 +13064,519 @@
                     <a:p>
                       <a:pPr algn="ctr"/>
                       <a:r>
-                        <a:rPr lang="en-US" sz="1400" smtClean="0"/>
+                        <a:rPr lang="en-US" sz="1400" dirty="0" smtClean="0"/>
+                        <a:t>10</a:t>
+                      </a:r>
+                      <a:endParaRPr lang="en-US" sz="1400" dirty="0"/>
+                    </a:p>
+                  </a:txBody>
+                  <a:tcPr>
+                    <a:lnT w="12700" cap="flat" cmpd="sng" algn="ctr">
+                      <a:solidFill>
+                        <a:scrgbClr r="0" g="0" b="0"/>
+                      </a:solidFill>
+                      <a:prstDash val="solid"/>
+                      <a:round/>
+                      <a:headEnd type="none" w="med" len="med"/>
+                      <a:tailEnd type="none" w="med" len="med"/>
+                    </a:lnT>
+                    <a:lnB w="12700" cap="flat" cmpd="sng" algn="ctr">
+                      <a:solidFill>
+                        <a:scrgbClr r="0" g="0" b="0"/>
+                      </a:solidFill>
+                      <a:prstDash val="solid"/>
+                      <a:round/>
+                      <a:headEnd type="none" w="med" len="med"/>
+                      <a:tailEnd type="none" w="med" len="med"/>
+                    </a:lnB>
+                  </a:tcPr>
+                </a:tc>
+                <a:tc>
+                  <a:txBody>
+                    <a:bodyPr/>
+                    <a:lstStyle/>
+                    <a:p>
+                      <a:pPr algn="ctr"/>
+                      <a:r>
+                        <a:rPr lang="en-US" sz="1400" dirty="0" smtClean="0"/>
+                        <a:t>1</a:t>
+                      </a:r>
+                      <a:endParaRPr lang="en-US" sz="1400" dirty="0"/>
+                    </a:p>
+                  </a:txBody>
+                  <a:tcPr>
+                    <a:lnT w="12700" cap="flat" cmpd="sng" algn="ctr">
+                      <a:solidFill>
+                        <a:scrgbClr r="0" g="0" b="0"/>
+                      </a:solidFill>
+                      <a:prstDash val="solid"/>
+                      <a:round/>
+                      <a:headEnd type="none" w="med" len="med"/>
+                      <a:tailEnd type="none" w="med" len="med"/>
+                    </a:lnT>
+                    <a:lnB w="12700" cap="flat" cmpd="sng" algn="ctr">
+                      <a:solidFill>
+                        <a:scrgbClr r="0" g="0" b="0"/>
+                      </a:solidFill>
+                      <a:prstDash val="solid"/>
+                      <a:round/>
+                      <a:headEnd type="none" w="med" len="med"/>
+                      <a:tailEnd type="none" w="med" len="med"/>
+                    </a:lnB>
+                  </a:tcPr>
+                </a:tc>
+                <a:tc>
+                  <a:txBody>
+                    <a:bodyPr/>
+                    <a:lstStyle/>
+                    <a:p>
+                      <a:pPr algn="ctr"/>
+                      <a:r>
+                        <a:rPr lang="en-US" sz="1400" dirty="0" smtClean="0"/>
+                        <a:t>10</a:t>
+                      </a:r>
+                      <a:endParaRPr lang="en-US" sz="1400" dirty="0"/>
+                    </a:p>
+                  </a:txBody>
+                  <a:tcPr>
+                    <a:lnT w="12700" cap="flat" cmpd="sng" algn="ctr">
+                      <a:solidFill>
+                        <a:scrgbClr r="0" g="0" b="0"/>
+                      </a:solidFill>
+                      <a:prstDash val="solid"/>
+                      <a:round/>
+                      <a:headEnd type="none" w="med" len="med"/>
+                      <a:tailEnd type="none" w="med" len="med"/>
+                    </a:lnT>
+                    <a:lnB w="12700" cap="flat" cmpd="sng" algn="ctr">
+                      <a:solidFill>
+                        <a:scrgbClr r="0" g="0" b="0"/>
+                      </a:solidFill>
+                      <a:prstDash val="solid"/>
+                      <a:round/>
+                      <a:headEnd type="none" w="med" len="med"/>
+                      <a:tailEnd type="none" w="med" len="med"/>
+                    </a:lnB>
+                  </a:tcPr>
+                </a:tc>
+                <a:tc>
+                  <a:txBody>
+                    <a:bodyPr/>
+                    <a:lstStyle/>
+                    <a:p>
+                      <a:pPr algn="ctr"/>
+                      <a:r>
+                        <a:rPr lang="en-US" sz="1400" dirty="0" smtClean="0"/>
+                        <a:t>10</a:t>
+                      </a:r>
+                      <a:endParaRPr lang="en-US" sz="1400" dirty="0"/>
+                    </a:p>
+                  </a:txBody>
+                  <a:tcPr>
+                    <a:lnT w="12700" cap="flat" cmpd="sng" algn="ctr">
+                      <a:solidFill>
+                        <a:scrgbClr r="0" g="0" b="0"/>
+                      </a:solidFill>
+                      <a:prstDash val="solid"/>
+                      <a:round/>
+                      <a:headEnd type="none" w="med" len="med"/>
+                      <a:tailEnd type="none" w="med" len="med"/>
+                    </a:lnT>
+                    <a:lnB w="12700" cap="flat" cmpd="sng" algn="ctr">
+                      <a:solidFill>
+                        <a:scrgbClr r="0" g="0" b="0"/>
+                      </a:solidFill>
+                      <a:prstDash val="solid"/>
+                      <a:round/>
+                      <a:headEnd type="none" w="med" len="med"/>
+                      <a:tailEnd type="none" w="med" len="med"/>
+                    </a:lnB>
+                  </a:tcPr>
+                </a:tc>
+                <a:tc>
+                  <a:txBody>
+                    <a:bodyPr/>
+                    <a:lstStyle/>
+                    <a:p>
+                      <a:pPr algn="ctr"/>
+                      <a:r>
+                        <a:rPr lang="en-US" sz="1400" dirty="0" smtClean="0"/>
+                        <a:t>1</a:t>
+                      </a:r>
+                      <a:endParaRPr lang="en-US" sz="1400" dirty="0"/>
+                    </a:p>
+                  </a:txBody>
+                  <a:tcPr>
+                    <a:lnT w="12700" cap="flat" cmpd="sng" algn="ctr">
+                      <a:solidFill>
+                        <a:scrgbClr r="0" g="0" b="0"/>
+                      </a:solidFill>
+                      <a:prstDash val="solid"/>
+                      <a:round/>
+                      <a:headEnd type="none" w="med" len="med"/>
+                      <a:tailEnd type="none" w="med" len="med"/>
+                    </a:lnT>
+                    <a:lnB w="12700" cap="flat" cmpd="sng" algn="ctr">
+                      <a:solidFill>
+                        <a:scrgbClr r="0" g="0" b="0"/>
+                      </a:solidFill>
+                      <a:prstDash val="solid"/>
+                      <a:round/>
+                      <a:headEnd type="none" w="med" len="med"/>
+                      <a:tailEnd type="none" w="med" len="med"/>
+                    </a:lnB>
+                  </a:tcPr>
+                </a:tc>
+                <a:tc>
+                  <a:txBody>
+                    <a:bodyPr/>
+                    <a:lstStyle/>
+                    <a:p>
+                      <a:pPr algn="ctr"/>
+                      <a:r>
+                        <a:rPr lang="en-US" sz="1400" dirty="0" smtClean="0"/>
+                        <a:t>1</a:t>
+                      </a:r>
+                      <a:endParaRPr lang="en-US" sz="1400" dirty="0"/>
+                    </a:p>
+                  </a:txBody>
+                  <a:tcPr>
+                    <a:lnT w="12700" cap="flat" cmpd="sng" algn="ctr">
+                      <a:solidFill>
+                        <a:scrgbClr r="0" g="0" b="0"/>
+                      </a:solidFill>
+                      <a:prstDash val="solid"/>
+                      <a:round/>
+                      <a:headEnd type="none" w="med" len="med"/>
+                      <a:tailEnd type="none" w="med" len="med"/>
+                    </a:lnT>
+                    <a:lnB w="12700" cap="flat" cmpd="sng" algn="ctr">
+                      <a:solidFill>
+                        <a:scrgbClr r="0" g="0" b="0"/>
+                      </a:solidFill>
+                      <a:prstDash val="solid"/>
+                      <a:round/>
+                      <a:headEnd type="none" w="med" len="med"/>
+                      <a:tailEnd type="none" w="med" len="med"/>
+                    </a:lnB>
+                  </a:tcPr>
+                </a:tc>
+              </a:tr>
+              <a:tr h="370840">
+                <a:tc>
+                  <a:txBody>
+                    <a:bodyPr/>
+                    <a:lstStyle/>
+                    <a:p>
+                      <a:pPr algn="ctr"/>
+                      <a:r>
+                        <a:rPr lang="en-US" sz="1400" dirty="0" smtClean="0"/>
+                        <a:t>M</a:t>
+                      </a:r>
+                      <a:endParaRPr lang="en-US" sz="1400" dirty="0"/>
+                    </a:p>
+                  </a:txBody>
+                  <a:tcPr>
+                    <a:lnT w="12700" cap="flat" cmpd="sng" algn="ctr">
+                      <a:solidFill>
+                        <a:scrgbClr r="0" g="0" b="0"/>
+                      </a:solidFill>
+                      <a:prstDash val="solid"/>
+                      <a:round/>
+                      <a:headEnd type="none" w="med" len="med"/>
+                      <a:tailEnd type="none" w="med" len="med"/>
+                    </a:lnT>
+                    <a:lnB w="12700" cap="flat" cmpd="sng" algn="ctr">
+                      <a:solidFill>
+                        <a:scrgbClr r="0" g="0" b="0"/>
+                      </a:solidFill>
+                      <a:prstDash val="solid"/>
+                      <a:round/>
+                      <a:headEnd type="none" w="med" len="med"/>
+                      <a:tailEnd type="none" w="med" len="med"/>
+                    </a:lnB>
+                  </a:tcPr>
+                </a:tc>
+                <a:tc>
+                  <a:txBody>
+                    <a:bodyPr/>
+                    <a:lstStyle/>
+                    <a:p>
+                      <a:pPr algn="ctr"/>
+                      <a:r>
+                        <a:rPr lang="en-US" sz="1400" dirty="0" smtClean="0"/>
+                        <a:t>1</a:t>
+                      </a:r>
+                      <a:endParaRPr lang="en-US" sz="1400" dirty="0"/>
+                    </a:p>
+                  </a:txBody>
+                  <a:tcPr>
+                    <a:lnT w="12700" cap="flat" cmpd="sng" algn="ctr">
+                      <a:solidFill>
+                        <a:scrgbClr r="0" g="0" b="0"/>
+                      </a:solidFill>
+                      <a:prstDash val="solid"/>
+                      <a:round/>
+                      <a:headEnd type="none" w="med" len="med"/>
+                      <a:tailEnd type="none" w="med" len="med"/>
+                    </a:lnT>
+                    <a:lnB w="12700" cap="flat" cmpd="sng" algn="ctr">
+                      <a:solidFill>
+                        <a:scrgbClr r="0" g="0" b="0"/>
+                      </a:solidFill>
+                      <a:prstDash val="solid"/>
+                      <a:round/>
+                      <a:headEnd type="none" w="med" len="med"/>
+                      <a:tailEnd type="none" w="med" len="med"/>
+                    </a:lnB>
+                  </a:tcPr>
+                </a:tc>
+                <a:tc>
+                  <a:txBody>
+                    <a:bodyPr/>
+                    <a:lstStyle/>
+                    <a:p>
+                      <a:pPr algn="ctr"/>
+                      <a:r>
+                        <a:rPr lang="en-US" sz="1400" dirty="0" smtClean="0"/>
+                        <a:t>1</a:t>
+                      </a:r>
+                      <a:endParaRPr lang="en-US" sz="1400" dirty="0"/>
+                    </a:p>
+                  </a:txBody>
+                  <a:tcPr>
+                    <a:lnT w="12700" cap="flat" cmpd="sng" algn="ctr">
+                      <a:solidFill>
+                        <a:scrgbClr r="0" g="0" b="0"/>
+                      </a:solidFill>
+                      <a:prstDash val="solid"/>
+                      <a:round/>
+                      <a:headEnd type="none" w="med" len="med"/>
+                      <a:tailEnd type="none" w="med" len="med"/>
+                    </a:lnT>
+                    <a:lnB w="12700" cap="flat" cmpd="sng" algn="ctr">
+                      <a:solidFill>
+                        <a:scrgbClr r="0" g="0" b="0"/>
+                      </a:solidFill>
+                      <a:prstDash val="solid"/>
+                      <a:round/>
+                      <a:headEnd type="none" w="med" len="med"/>
+                      <a:tailEnd type="none" w="med" len="med"/>
+                    </a:lnB>
+                  </a:tcPr>
+                </a:tc>
+                <a:tc>
+                  <a:txBody>
+                    <a:bodyPr/>
+                    <a:lstStyle/>
+                    <a:p>
+                      <a:pPr algn="ctr"/>
+                      <a:r>
+                        <a:rPr lang="en-US" sz="1400" dirty="0" smtClean="0"/>
+                        <a:t>1</a:t>
+                      </a:r>
+                      <a:endParaRPr lang="en-US" sz="1400" dirty="0"/>
+                    </a:p>
+                  </a:txBody>
+                  <a:tcPr>
+                    <a:lnT w="12700" cap="flat" cmpd="sng" algn="ctr">
+                      <a:solidFill>
+                        <a:scrgbClr r="0" g="0" b="0"/>
+                      </a:solidFill>
+                      <a:prstDash val="solid"/>
+                      <a:round/>
+                      <a:headEnd type="none" w="med" len="med"/>
+                      <a:tailEnd type="none" w="med" len="med"/>
+                    </a:lnT>
+                    <a:lnB w="12700" cap="flat" cmpd="sng" algn="ctr">
+                      <a:solidFill>
+                        <a:scrgbClr r="0" g="0" b="0"/>
+                      </a:solidFill>
+                      <a:prstDash val="solid"/>
+                      <a:round/>
+                      <a:headEnd type="none" w="med" len="med"/>
+                      <a:tailEnd type="none" w="med" len="med"/>
+                    </a:lnB>
+                  </a:tcPr>
+                </a:tc>
+                <a:tc>
+                  <a:txBody>
+                    <a:bodyPr/>
+                    <a:lstStyle/>
+                    <a:p>
+                      <a:pPr algn="ctr"/>
+                      <a:r>
+                        <a:rPr lang="en-US" sz="1400" dirty="0" smtClean="0"/>
+                        <a:t>10</a:t>
+                      </a:r>
+                      <a:endParaRPr lang="en-US" sz="1400" dirty="0"/>
+                    </a:p>
+                  </a:txBody>
+                  <a:tcPr>
+                    <a:lnT w="12700" cap="flat" cmpd="sng" algn="ctr">
+                      <a:solidFill>
+                        <a:scrgbClr r="0" g="0" b="0"/>
+                      </a:solidFill>
+                      <a:prstDash val="solid"/>
+                      <a:round/>
+                      <a:headEnd type="none" w="med" len="med"/>
+                      <a:tailEnd type="none" w="med" len="med"/>
+                    </a:lnT>
+                    <a:lnB w="12700" cap="flat" cmpd="sng" algn="ctr">
+                      <a:solidFill>
+                        <a:scrgbClr r="0" g="0" b="0"/>
+                      </a:solidFill>
+                      <a:prstDash val="solid"/>
+                      <a:round/>
+                      <a:headEnd type="none" w="med" len="med"/>
+                      <a:tailEnd type="none" w="med" len="med"/>
+                    </a:lnB>
+                  </a:tcPr>
+                </a:tc>
+                <a:tc>
+                  <a:txBody>
+                    <a:bodyPr/>
+                    <a:lstStyle/>
+                    <a:p>
+                      <a:pPr algn="ctr"/>
+                      <a:r>
+                        <a:rPr lang="en-US" sz="1400" dirty="0" smtClean="0"/>
+                        <a:t>1</a:t>
+                      </a:r>
+                      <a:endParaRPr lang="en-US" sz="1400" dirty="0"/>
+                    </a:p>
+                  </a:txBody>
+                  <a:tcPr>
+                    <a:lnT w="12700" cap="flat" cmpd="sng" algn="ctr">
+                      <a:solidFill>
+                        <a:scrgbClr r="0" g="0" b="0"/>
+                      </a:solidFill>
+                      <a:prstDash val="solid"/>
+                      <a:round/>
+                      <a:headEnd type="none" w="med" len="med"/>
+                      <a:tailEnd type="none" w="med" len="med"/>
+                    </a:lnT>
+                    <a:lnB w="12700" cap="flat" cmpd="sng" algn="ctr">
+                      <a:solidFill>
+                        <a:scrgbClr r="0" g="0" b="0"/>
+                      </a:solidFill>
+                      <a:prstDash val="solid"/>
+                      <a:round/>
+                      <a:headEnd type="none" w="med" len="med"/>
+                      <a:tailEnd type="none" w="med" len="med"/>
+                    </a:lnB>
+                  </a:tcPr>
+                </a:tc>
+                <a:tc>
+                  <a:txBody>
+                    <a:bodyPr/>
+                    <a:lstStyle/>
+                    <a:p>
+                      <a:pPr algn="ctr"/>
+                      <a:r>
+                        <a:rPr lang="en-US" sz="1400" dirty="0" smtClean="0"/>
+                        <a:t>1</a:t>
+                      </a:r>
+                      <a:endParaRPr lang="en-US" sz="1400" dirty="0"/>
+                    </a:p>
+                  </a:txBody>
+                  <a:tcPr>
+                    <a:lnT w="12700" cap="flat" cmpd="sng" algn="ctr">
+                      <a:solidFill>
+                        <a:scrgbClr r="0" g="0" b="0"/>
+                      </a:solidFill>
+                      <a:prstDash val="solid"/>
+                      <a:round/>
+                      <a:headEnd type="none" w="med" len="med"/>
+                      <a:tailEnd type="none" w="med" len="med"/>
+                    </a:lnT>
+                    <a:lnB w="12700" cap="flat" cmpd="sng" algn="ctr">
+                      <a:solidFill>
+                        <a:scrgbClr r="0" g="0" b="0"/>
+                      </a:solidFill>
+                      <a:prstDash val="solid"/>
+                      <a:round/>
+                      <a:headEnd type="none" w="med" len="med"/>
+                      <a:tailEnd type="none" w="med" len="med"/>
+                    </a:lnB>
+                  </a:tcPr>
+                </a:tc>
+                <a:tc>
+                  <a:txBody>
+                    <a:bodyPr/>
+                    <a:lstStyle/>
+                    <a:p>
+                      <a:pPr algn="ctr"/>
+                      <a:r>
+                        <a:rPr lang="en-US" sz="1400" dirty="0" smtClean="0"/>
+                        <a:t>10</a:t>
+                      </a:r>
+                      <a:endParaRPr lang="en-US" sz="1400" dirty="0"/>
+                    </a:p>
+                  </a:txBody>
+                  <a:tcPr>
+                    <a:lnT w="12700" cap="flat" cmpd="sng" algn="ctr">
+                      <a:solidFill>
+                        <a:scrgbClr r="0" g="0" b="0"/>
+                      </a:solidFill>
+                      <a:prstDash val="solid"/>
+                      <a:round/>
+                      <a:headEnd type="none" w="med" len="med"/>
+                      <a:tailEnd type="none" w="med" len="med"/>
+                    </a:lnT>
+                    <a:lnB w="12700" cap="flat" cmpd="sng" algn="ctr">
+                      <a:solidFill>
+                        <a:scrgbClr r="0" g="0" b="0"/>
+                      </a:solidFill>
+                      <a:prstDash val="solid"/>
+                      <a:round/>
+                      <a:headEnd type="none" w="med" len="med"/>
+                      <a:tailEnd type="none" w="med" len="med"/>
+                    </a:lnB>
+                  </a:tcPr>
+                </a:tc>
+                <a:tc>
+                  <a:txBody>
+                    <a:bodyPr/>
+                    <a:lstStyle/>
+                    <a:p>
+                      <a:pPr algn="ctr"/>
+                      <a:r>
+                        <a:rPr lang="en-US" sz="1400" dirty="0" smtClean="0"/>
+                        <a:t>1</a:t>
+                      </a:r>
+                      <a:endParaRPr lang="en-US" sz="1400" dirty="0"/>
+                    </a:p>
+                  </a:txBody>
+                  <a:tcPr>
+                    <a:lnT w="12700" cap="flat" cmpd="sng" algn="ctr">
+                      <a:solidFill>
+                        <a:scrgbClr r="0" g="0" b="0"/>
+                      </a:solidFill>
+                      <a:prstDash val="solid"/>
+                      <a:round/>
+                      <a:headEnd type="none" w="med" len="med"/>
+                      <a:tailEnd type="none" w="med" len="med"/>
+                    </a:lnT>
+                    <a:lnB w="12700" cap="flat" cmpd="sng" algn="ctr">
+                      <a:solidFill>
+                        <a:scrgbClr r="0" g="0" b="0"/>
+                      </a:solidFill>
+                      <a:prstDash val="solid"/>
+                      <a:round/>
+                      <a:headEnd type="none" w="med" len="med"/>
+                      <a:tailEnd type="none" w="med" len="med"/>
+                    </a:lnB>
+                  </a:tcPr>
+                </a:tc>
+                <a:tc>
+                  <a:txBody>
+                    <a:bodyPr/>
+                    <a:lstStyle/>
+                    <a:p>
+                      <a:pPr algn="ctr"/>
+                      <a:r>
+                        <a:rPr lang="en-US" sz="1400" dirty="0" smtClean="0"/>
                         <a:t>1</a:t>
                       </a:r>
                       <a:endParaRPr lang="en-US" sz="1400" dirty="0"/>
@@ -13269,7 +13781,7 @@
     </p:spTree>
     <p:extLst>
       <p:ext uri="{BB962C8B-B14F-4D97-AF65-F5344CB8AC3E}">
-        <p14:creationId xmlns:p14="http://schemas.microsoft.com/office/powerpoint/2010/main" val="2770004023"/>
+        <p14:creationId xmlns:p14="http://schemas.microsoft.com/office/powerpoint/2010/main" val="4154214979"/>
       </p:ext>
     </p:extLst>
   </p:cSld>

</xml_diff>

<commit_message>
Calculated prefixs (e.g. 10bp) to construct FCharTab
</commit_message>
<xml_diff>
--- a/hisat2_test/GCSA_paper_example.pptx
+++ b/hisat2_test/GCSA_paper_example.pptx
@@ -290,7 +290,7 @@
           <a:p>
             <a:fld id="{FA0EBC18-7907-1F45-BE8D-CA697DC3E666}" type="datetimeFigureOut">
               <a:rPr lang="en-US" smtClean="0"/>
-              <a:t>5/27/15</a:t>
+              <a:t>5/28/15</a:t>
             </a:fld>
             <a:endParaRPr lang="en-US"/>
           </a:p>
@@ -460,7 +460,7 @@
           <a:p>
             <a:fld id="{FA0EBC18-7907-1F45-BE8D-CA697DC3E666}" type="datetimeFigureOut">
               <a:rPr lang="en-US" smtClean="0"/>
-              <a:t>5/27/15</a:t>
+              <a:t>5/28/15</a:t>
             </a:fld>
             <a:endParaRPr lang="en-US"/>
           </a:p>
@@ -640,7 +640,7 @@
           <a:p>
             <a:fld id="{FA0EBC18-7907-1F45-BE8D-CA697DC3E666}" type="datetimeFigureOut">
               <a:rPr lang="en-US" smtClean="0"/>
-              <a:t>5/27/15</a:t>
+              <a:t>5/28/15</a:t>
             </a:fld>
             <a:endParaRPr lang="en-US"/>
           </a:p>
@@ -810,7 +810,7 @@
           <a:p>
             <a:fld id="{FA0EBC18-7907-1F45-BE8D-CA697DC3E666}" type="datetimeFigureOut">
               <a:rPr lang="en-US" smtClean="0"/>
-              <a:t>5/27/15</a:t>
+              <a:t>5/28/15</a:t>
             </a:fld>
             <a:endParaRPr lang="en-US"/>
           </a:p>
@@ -1056,7 +1056,7 @@
           <a:p>
             <a:fld id="{FA0EBC18-7907-1F45-BE8D-CA697DC3E666}" type="datetimeFigureOut">
               <a:rPr lang="en-US" smtClean="0"/>
-              <a:t>5/27/15</a:t>
+              <a:t>5/28/15</a:t>
             </a:fld>
             <a:endParaRPr lang="en-US"/>
           </a:p>
@@ -1344,7 +1344,7 @@
           <a:p>
             <a:fld id="{FA0EBC18-7907-1F45-BE8D-CA697DC3E666}" type="datetimeFigureOut">
               <a:rPr lang="en-US" smtClean="0"/>
-              <a:t>5/27/15</a:t>
+              <a:t>5/28/15</a:t>
             </a:fld>
             <a:endParaRPr lang="en-US"/>
           </a:p>
@@ -1766,7 +1766,7 @@
           <a:p>
             <a:fld id="{FA0EBC18-7907-1F45-BE8D-CA697DC3E666}" type="datetimeFigureOut">
               <a:rPr lang="en-US" smtClean="0"/>
-              <a:t>5/27/15</a:t>
+              <a:t>5/28/15</a:t>
             </a:fld>
             <a:endParaRPr lang="en-US"/>
           </a:p>
@@ -1884,7 +1884,7 @@
           <a:p>
             <a:fld id="{FA0EBC18-7907-1F45-BE8D-CA697DC3E666}" type="datetimeFigureOut">
               <a:rPr lang="en-US" smtClean="0"/>
-              <a:t>5/27/15</a:t>
+              <a:t>5/28/15</a:t>
             </a:fld>
             <a:endParaRPr lang="en-US"/>
           </a:p>
@@ -1979,7 +1979,7 @@
           <a:p>
             <a:fld id="{FA0EBC18-7907-1F45-BE8D-CA697DC3E666}" type="datetimeFigureOut">
               <a:rPr lang="en-US" smtClean="0"/>
-              <a:t>5/27/15</a:t>
+              <a:t>5/28/15</a:t>
             </a:fld>
             <a:endParaRPr lang="en-US"/>
           </a:p>
@@ -2256,7 +2256,7 @@
           <a:p>
             <a:fld id="{FA0EBC18-7907-1F45-BE8D-CA697DC3E666}" type="datetimeFigureOut">
               <a:rPr lang="en-US" smtClean="0"/>
-              <a:t>5/27/15</a:t>
+              <a:t>5/28/15</a:t>
             </a:fld>
             <a:endParaRPr lang="en-US"/>
           </a:p>
@@ -2509,7 +2509,7 @@
           <a:p>
             <a:fld id="{FA0EBC18-7907-1F45-BE8D-CA697DC3E666}" type="datetimeFigureOut">
               <a:rPr lang="en-US" smtClean="0"/>
-              <a:t>5/27/15</a:t>
+              <a:t>5/28/15</a:t>
             </a:fld>
             <a:endParaRPr lang="en-US"/>
           </a:p>
@@ -2722,7 +2722,7 @@
           <a:p>
             <a:fld id="{FA0EBC18-7907-1F45-BE8D-CA697DC3E666}" type="datetimeFigureOut">
               <a:rPr lang="en-US" smtClean="0"/>
-              <a:t>5/27/15</a:t>
+              <a:t>5/28/15</a:t>
             </a:fld>
             <a:endParaRPr lang="en-US"/>
           </a:p>
@@ -13141,7 +13141,7 @@
         </p:nvGrpSpPr>
         <p:grpSpPr>
           <a:xfrm>
-            <a:off x="1210935" y="2373466"/>
+            <a:off x="1210935" y="2482330"/>
             <a:ext cx="302386" cy="369332"/>
             <a:chOff x="320518" y="616459"/>
             <a:chExt cx="302386" cy="369332"/>
@@ -13231,7 +13231,7 @@
         </p:nvGrpSpPr>
         <p:grpSpPr>
           <a:xfrm>
-            <a:off x="1851015" y="2373466"/>
+            <a:off x="1851015" y="2482330"/>
             <a:ext cx="302386" cy="369332"/>
             <a:chOff x="320518" y="616459"/>
             <a:chExt cx="302386" cy="369332"/>
@@ -13321,7 +13321,7 @@
         </p:nvGrpSpPr>
         <p:grpSpPr>
           <a:xfrm>
-            <a:off x="2491095" y="2374666"/>
+            <a:off x="2491095" y="2483530"/>
             <a:ext cx="302386" cy="369332"/>
             <a:chOff x="320518" y="616459"/>
             <a:chExt cx="302386" cy="369332"/>
@@ -13411,7 +13411,7 @@
         </p:nvGrpSpPr>
         <p:grpSpPr>
           <a:xfrm>
-            <a:off x="3131175" y="2375866"/>
+            <a:off x="3131175" y="2484730"/>
             <a:ext cx="302386" cy="369332"/>
             <a:chOff x="320518" y="616459"/>
             <a:chExt cx="302386" cy="369332"/>
@@ -13501,7 +13501,7 @@
         </p:nvGrpSpPr>
         <p:grpSpPr>
           <a:xfrm>
-            <a:off x="3771255" y="2387962"/>
+            <a:off x="3771255" y="2496826"/>
             <a:ext cx="296333" cy="369332"/>
             <a:chOff x="326571" y="628555"/>
             <a:chExt cx="296333" cy="369332"/>
@@ -13591,7 +13591,7 @@
         </p:nvGrpSpPr>
         <p:grpSpPr>
           <a:xfrm>
-            <a:off x="4411335" y="2375866"/>
+            <a:off x="4411335" y="2484730"/>
             <a:ext cx="302386" cy="369332"/>
             <a:chOff x="320518" y="616459"/>
             <a:chExt cx="302386" cy="369332"/>
@@ -13681,7 +13681,7 @@
         </p:nvGrpSpPr>
         <p:grpSpPr>
           <a:xfrm>
-            <a:off x="5051415" y="2371018"/>
+            <a:off x="5051415" y="2479882"/>
             <a:ext cx="302386" cy="369332"/>
             <a:chOff x="320518" y="616459"/>
             <a:chExt cx="302386" cy="369332"/>
@@ -13771,7 +13771,7 @@
         </p:nvGrpSpPr>
         <p:grpSpPr>
           <a:xfrm>
-            <a:off x="5691495" y="2371285"/>
+            <a:off x="5691495" y="2480149"/>
             <a:ext cx="302386" cy="369332"/>
             <a:chOff x="6037243" y="2487168"/>
             <a:chExt cx="302386" cy="369332"/>
@@ -13861,7 +13861,7 @@
         </p:nvGrpSpPr>
         <p:grpSpPr>
           <a:xfrm>
-            <a:off x="6331575" y="2385514"/>
+            <a:off x="6331575" y="2494378"/>
             <a:ext cx="296333" cy="369332"/>
             <a:chOff x="326571" y="628555"/>
             <a:chExt cx="296333" cy="369332"/>
@@ -13951,7 +13951,7 @@
         </p:nvSpPr>
         <p:spPr>
           <a:xfrm>
-            <a:off x="6977708" y="2435520"/>
+            <a:off x="6977708" y="2544384"/>
             <a:ext cx="296333" cy="290286"/>
           </a:xfrm>
           <a:prstGeom prst="ellipse">
@@ -13996,7 +13996,7 @@
         </p:nvSpPr>
         <p:spPr>
           <a:xfrm>
-            <a:off x="6971655" y="2371285"/>
+            <a:off x="6971655" y="2480149"/>
             <a:ext cx="175381" cy="369332"/>
           </a:xfrm>
           <a:prstGeom prst="rect">
@@ -14026,7 +14026,7 @@
         </p:nvGrpSpPr>
         <p:grpSpPr>
           <a:xfrm>
-            <a:off x="7611735" y="2375818"/>
+            <a:off x="7611735" y="2484682"/>
             <a:ext cx="296333" cy="369332"/>
             <a:chOff x="326571" y="616459"/>
             <a:chExt cx="296333" cy="369332"/>
@@ -14115,7 +14115,7 @@
         </p:nvGrpSpPr>
         <p:grpSpPr>
           <a:xfrm>
-            <a:off x="2498348" y="3053242"/>
+            <a:off x="2498348" y="3162106"/>
             <a:ext cx="296333" cy="369332"/>
             <a:chOff x="326571" y="628555"/>
             <a:chExt cx="296333" cy="369332"/>
@@ -14208,7 +14208,7 @@
         </p:nvCxnSpPr>
         <p:spPr>
           <a:xfrm>
-            <a:off x="1513321" y="2579511"/>
+            <a:off x="1513321" y="2688375"/>
             <a:ext cx="343747" cy="0"/>
           </a:xfrm>
           <a:prstGeom prst="straightConnector1">
@@ -14248,7 +14248,7 @@
         </p:nvCxnSpPr>
         <p:spPr>
           <a:xfrm>
-            <a:off x="2153401" y="2579511"/>
+            <a:off x="2153401" y="2688375"/>
             <a:ext cx="343747" cy="1200"/>
           </a:xfrm>
           <a:prstGeom prst="straightConnector1">
@@ -14288,7 +14288,7 @@
         </p:nvCxnSpPr>
         <p:spPr>
           <a:xfrm>
-            <a:off x="1469924" y="2682143"/>
+            <a:off x="1469924" y="2791007"/>
             <a:ext cx="431741" cy="461216"/>
           </a:xfrm>
           <a:prstGeom prst="straightConnector1">
@@ -14328,7 +14328,7 @@
         </p:nvCxnSpPr>
         <p:spPr>
           <a:xfrm>
-            <a:off x="2793481" y="2580711"/>
+            <a:off x="2793481" y="2689575"/>
             <a:ext cx="343747" cy="1200"/>
           </a:xfrm>
           <a:prstGeom prst="straightConnector1">
@@ -14368,7 +14368,7 @@
         </p:nvCxnSpPr>
         <p:spPr>
           <a:xfrm>
-            <a:off x="3433561" y="2581911"/>
+            <a:off x="3433561" y="2690775"/>
             <a:ext cx="337694" cy="0"/>
           </a:xfrm>
           <a:prstGeom prst="straightConnector1">
@@ -14408,7 +14408,7 @@
         </p:nvCxnSpPr>
         <p:spPr>
           <a:xfrm>
-            <a:off x="4067588" y="2581911"/>
+            <a:off x="4067588" y="2690775"/>
             <a:ext cx="349800" cy="0"/>
           </a:xfrm>
           <a:prstGeom prst="straightConnector1">
@@ -14448,7 +14448,7 @@
         </p:nvCxnSpPr>
         <p:spPr>
           <a:xfrm flipV="1">
-            <a:off x="4713721" y="2577063"/>
+            <a:off x="4713721" y="2685927"/>
             <a:ext cx="343747" cy="4848"/>
           </a:xfrm>
           <a:prstGeom prst="straightConnector1">
@@ -14488,7 +14488,7 @@
         </p:nvCxnSpPr>
         <p:spPr>
           <a:xfrm>
-            <a:off x="5353801" y="2577063"/>
+            <a:off x="5353801" y="2685927"/>
             <a:ext cx="343747" cy="1200"/>
           </a:xfrm>
           <a:prstGeom prst="straightConnector1">
@@ -14528,7 +14528,7 @@
         </p:nvCxnSpPr>
         <p:spPr>
           <a:xfrm>
-            <a:off x="5993881" y="2578263"/>
+            <a:off x="5993881" y="2687127"/>
             <a:ext cx="337694" cy="1200"/>
           </a:xfrm>
           <a:prstGeom prst="straightConnector1">
@@ -14568,7 +14568,7 @@
         </p:nvCxnSpPr>
         <p:spPr>
           <a:xfrm>
-            <a:off x="6627908" y="2579463"/>
+            <a:off x="6627908" y="2688327"/>
             <a:ext cx="349800" cy="1200"/>
           </a:xfrm>
           <a:prstGeom prst="straightConnector1">
@@ -14608,7 +14608,7 @@
         </p:nvCxnSpPr>
         <p:spPr>
           <a:xfrm>
-            <a:off x="7274041" y="2580663"/>
+            <a:off x="7274041" y="2689527"/>
             <a:ext cx="337694" cy="1200"/>
           </a:xfrm>
           <a:prstGeom prst="straightConnector1">
@@ -14648,7 +14648,7 @@
         </p:nvCxnSpPr>
         <p:spPr>
           <a:xfrm flipV="1">
-            <a:off x="2751284" y="2684543"/>
+            <a:off x="2751284" y="2793407"/>
             <a:ext cx="429341" cy="460016"/>
           </a:xfrm>
           <a:prstGeom prst="straightConnector1">
@@ -14688,7 +14688,7 @@
         </p:nvCxnSpPr>
         <p:spPr>
           <a:xfrm rot="16200000" flipH="1">
-            <a:off x="3281768" y="1799115"/>
+            <a:off x="3281768" y="1907979"/>
             <a:ext cx="1200" cy="1274107"/>
           </a:xfrm>
           <a:prstGeom prst="curvedConnector3">
@@ -14727,7 +14727,7 @@
         </p:nvSpPr>
         <p:spPr>
           <a:xfrm>
-            <a:off x="1289544" y="2676227"/>
+            <a:off x="1289544" y="2785091"/>
             <a:ext cx="105023" cy="246221"/>
           </a:xfrm>
           <a:prstGeom prst="rect">
@@ -14765,7 +14765,7 @@
         </p:nvSpPr>
         <p:spPr>
           <a:xfrm>
-            <a:off x="1919736" y="2677427"/>
+            <a:off x="1919736" y="2786291"/>
             <a:ext cx="105023" cy="246221"/>
           </a:xfrm>
           <a:prstGeom prst="rect">
@@ -14803,7 +14803,7 @@
         </p:nvSpPr>
         <p:spPr>
           <a:xfrm>
-            <a:off x="2562024" y="2672579"/>
+            <a:off x="2562024" y="2781443"/>
             <a:ext cx="105023" cy="246221"/>
           </a:xfrm>
           <a:prstGeom prst="rect">
@@ -14841,7 +14841,7 @@
         </p:nvSpPr>
         <p:spPr>
           <a:xfrm>
-            <a:off x="3174072" y="2673779"/>
+            <a:off x="3174072" y="2782643"/>
             <a:ext cx="105023" cy="246221"/>
           </a:xfrm>
           <a:prstGeom prst="rect">
@@ -14879,7 +14879,7 @@
         </p:nvSpPr>
         <p:spPr>
           <a:xfrm>
-            <a:off x="3810312" y="2674979"/>
+            <a:off x="3810312" y="2783843"/>
             <a:ext cx="105023" cy="246221"/>
           </a:xfrm>
           <a:prstGeom prst="rect">
@@ -14917,7 +14917,7 @@
         </p:nvSpPr>
         <p:spPr>
           <a:xfrm>
-            <a:off x="4476792" y="2676179"/>
+            <a:off x="4476792" y="2785043"/>
             <a:ext cx="105023" cy="246221"/>
           </a:xfrm>
           <a:prstGeom prst="rect">
@@ -14955,7 +14955,7 @@
         </p:nvSpPr>
         <p:spPr>
           <a:xfrm>
-            <a:off x="5125128" y="2677379"/>
+            <a:off x="5125128" y="2786243"/>
             <a:ext cx="105023" cy="246221"/>
           </a:xfrm>
           <a:prstGeom prst="rect">
@@ -14993,7 +14993,7 @@
         </p:nvSpPr>
         <p:spPr>
           <a:xfrm>
-            <a:off x="5767416" y="2672531"/>
+            <a:off x="5767416" y="2781395"/>
             <a:ext cx="105023" cy="246221"/>
           </a:xfrm>
           <a:prstGeom prst="rect">
@@ -15031,7 +15031,7 @@
         </p:nvSpPr>
         <p:spPr>
           <a:xfrm>
-            <a:off x="6379464" y="2673731"/>
+            <a:off x="6379464" y="2782595"/>
             <a:ext cx="105023" cy="246221"/>
           </a:xfrm>
           <a:prstGeom prst="rect">
@@ -15064,7 +15064,7 @@
         </p:nvSpPr>
         <p:spPr>
           <a:xfrm>
-            <a:off x="7021752" y="2674931"/>
+            <a:off x="7021752" y="2783795"/>
             <a:ext cx="173665" cy="246221"/>
           </a:xfrm>
           <a:prstGeom prst="rect">
@@ -15097,7 +15097,7 @@
         </p:nvSpPr>
         <p:spPr>
           <a:xfrm>
-            <a:off x="7645896" y="2676131"/>
+            <a:off x="7645896" y="2784995"/>
             <a:ext cx="173665" cy="246221"/>
           </a:xfrm>
           <a:prstGeom prst="rect">
@@ -15130,7 +15130,7 @@
         </p:nvSpPr>
         <p:spPr>
           <a:xfrm>
-            <a:off x="2501544" y="3350967"/>
+            <a:off x="2501544" y="3459831"/>
             <a:ext cx="173665" cy="246221"/>
           </a:xfrm>
           <a:prstGeom prst="rect">
@@ -15163,7 +15163,7 @@
         </p:nvGrpSpPr>
         <p:grpSpPr>
           <a:xfrm>
-            <a:off x="1858263" y="3039946"/>
+            <a:off x="1858263" y="3148810"/>
             <a:ext cx="296338" cy="369332"/>
             <a:chOff x="2204011" y="3155829"/>
             <a:chExt cx="296338" cy="369332"/>
@@ -15253,7 +15253,7 @@
         </p:nvSpPr>
         <p:spPr>
           <a:xfrm>
-            <a:off x="1920936" y="3343907"/>
+            <a:off x="1920936" y="3452771"/>
             <a:ext cx="105023" cy="246221"/>
           </a:xfrm>
           <a:prstGeom prst="rect">
@@ -15294,7 +15294,7 @@
         </p:nvCxnSpPr>
         <p:spPr>
           <a:xfrm>
-            <a:off x="2154601" y="3245991"/>
+            <a:off x="2154601" y="3354855"/>
             <a:ext cx="343747" cy="1200"/>
           </a:xfrm>
           <a:prstGeom prst="straightConnector1">
@@ -15331,7 +15331,7 @@
         </p:nvGrpSpPr>
         <p:grpSpPr>
           <a:xfrm>
-            <a:off x="4416317" y="3058090"/>
+            <a:off x="4416317" y="3166954"/>
             <a:ext cx="296333" cy="369332"/>
             <a:chOff x="4762065" y="3173973"/>
             <a:chExt cx="296333" cy="369332"/>
@@ -15421,7 +15421,7 @@
         </p:nvSpPr>
         <p:spPr>
           <a:xfrm>
-            <a:off x="4478985" y="3362051"/>
+            <a:off x="4478985" y="3470915"/>
             <a:ext cx="105023" cy="246221"/>
           </a:xfrm>
           <a:prstGeom prst="rect">
@@ -15462,7 +15462,7 @@
         </p:nvCxnSpPr>
         <p:spPr>
           <a:xfrm>
-            <a:off x="4024191" y="2684543"/>
+            <a:off x="4024191" y="2793407"/>
             <a:ext cx="435523" cy="476960"/>
           </a:xfrm>
           <a:prstGeom prst="straightConnector1">
@@ -15502,7 +15502,7 @@
         </p:nvCxnSpPr>
         <p:spPr>
           <a:xfrm flipV="1">
-            <a:off x="4669253" y="2680895"/>
+            <a:off x="4669253" y="2789759"/>
             <a:ext cx="1071692" cy="480608"/>
           </a:xfrm>
           <a:prstGeom prst="straightConnector1">
@@ -15539,7 +15539,7 @@
         </p:nvSpPr>
         <p:spPr>
           <a:xfrm>
-            <a:off x="1208718" y="2217779"/>
+            <a:off x="1208718" y="2326643"/>
             <a:ext cx="332953" cy="246221"/>
           </a:xfrm>
           <a:prstGeom prst="rect">
@@ -15577,7 +15577,7 @@
         </p:nvSpPr>
         <p:spPr>
           <a:xfrm>
-            <a:off x="1618535" y="2218979"/>
+            <a:off x="1618535" y="2327843"/>
             <a:ext cx="757141" cy="246221"/>
           </a:xfrm>
           <a:prstGeom prst="rect">
@@ -15615,7 +15615,7 @@
         </p:nvSpPr>
         <p:spPr>
           <a:xfrm>
-            <a:off x="1734648" y="2873363"/>
+            <a:off x="1734648" y="2982227"/>
             <a:ext cx="532176" cy="246221"/>
           </a:xfrm>
           <a:prstGeom prst="rect">
@@ -15653,7 +15653,7 @@
         </p:nvSpPr>
         <p:spPr>
           <a:xfrm>
-            <a:off x="2407176" y="2868515"/>
+            <a:off x="2407176" y="2977379"/>
             <a:ext cx="532176" cy="246221"/>
           </a:xfrm>
           <a:prstGeom prst="rect">
@@ -15691,7 +15691,7 @@
         </p:nvSpPr>
         <p:spPr>
           <a:xfrm>
-            <a:off x="2321303" y="2081075"/>
+            <a:off x="2321303" y="2189939"/>
             <a:ext cx="757141" cy="246221"/>
           </a:xfrm>
           <a:prstGeom prst="rect">
@@ -15729,7 +15729,7 @@
         </p:nvSpPr>
         <p:spPr>
           <a:xfrm>
-            <a:off x="3047063" y="2220179"/>
+            <a:off x="3047063" y="2329043"/>
             <a:ext cx="513506" cy="246221"/>
           </a:xfrm>
           <a:prstGeom prst="rect">
@@ -15767,7 +15767,7 @@
         </p:nvSpPr>
         <p:spPr>
           <a:xfrm>
-            <a:off x="3834503" y="2215331"/>
+            <a:off x="3834503" y="2324195"/>
             <a:ext cx="513506" cy="246221"/>
           </a:xfrm>
           <a:prstGeom prst="rect">
@@ -15805,7 +15805,7 @@
         </p:nvSpPr>
         <p:spPr>
           <a:xfrm>
-            <a:off x="4253014" y="2216531"/>
+            <a:off x="4253014" y="2325395"/>
             <a:ext cx="632429" cy="246221"/>
           </a:xfrm>
           <a:prstGeom prst="rect">
@@ -15843,7 +15843,7 @@
         </p:nvSpPr>
         <p:spPr>
           <a:xfrm>
-            <a:off x="4943687" y="2217731"/>
+            <a:off x="4943687" y="2326595"/>
             <a:ext cx="528376" cy="246221"/>
           </a:xfrm>
           <a:prstGeom prst="rect">
@@ -15881,7 +15881,7 @@
         </p:nvSpPr>
         <p:spPr>
           <a:xfrm>
-            <a:off x="5610167" y="2218931"/>
+            <a:off x="5610167" y="2327795"/>
             <a:ext cx="454562" cy="246221"/>
           </a:xfrm>
           <a:prstGeom prst="rect">
@@ -15919,7 +15919,7 @@
         </p:nvSpPr>
         <p:spPr>
           <a:xfrm>
-            <a:off x="6270599" y="2220131"/>
+            <a:off x="6270599" y="2328995"/>
             <a:ext cx="454562" cy="246221"/>
           </a:xfrm>
           <a:prstGeom prst="rect">
@@ -15957,7 +15957,7 @@
         </p:nvSpPr>
         <p:spPr>
           <a:xfrm>
-            <a:off x="6960070" y="2220131"/>
+            <a:off x="6960070" y="2328995"/>
             <a:ext cx="397447" cy="246221"/>
           </a:xfrm>
           <a:prstGeom prst="rect">
@@ -15995,7 +15995,7 @@
         </p:nvSpPr>
         <p:spPr>
           <a:xfrm>
-            <a:off x="7638646" y="2215283"/>
+            <a:off x="7638646" y="2324147"/>
             <a:ext cx="259539" cy="246221"/>
           </a:xfrm>
           <a:prstGeom prst="rect">
@@ -16033,7 +16033,7 @@
         </p:nvSpPr>
         <p:spPr>
           <a:xfrm>
-            <a:off x="4271160" y="2869715"/>
+            <a:off x="4271160" y="2978579"/>
             <a:ext cx="756068" cy="246221"/>
           </a:xfrm>
           <a:prstGeom prst="rect">
@@ -16074,7 +16074,7 @@
         </p:nvCxnSpPr>
         <p:spPr>
           <a:xfrm flipV="1">
-            <a:off x="4712650" y="2725806"/>
+            <a:off x="4712650" y="2834670"/>
             <a:ext cx="2413225" cy="538329"/>
           </a:xfrm>
           <a:prstGeom prst="straightConnector1">
@@ -16112,7 +16112,7 @@
           <p:nvPr>
             <p:extLst>
               <p:ext uri="{D42A27DB-BD31-4B8C-83A1-F6EECF244321}">
-                <p14:modId xmlns:p14="http://schemas.microsoft.com/office/powerpoint/2010/main" val="150187944"/>
+                <p14:modId xmlns:p14="http://schemas.microsoft.com/office/powerpoint/2010/main" val="208486870"/>
               </p:ext>
             </p:extLst>
           </p:nvPr>
@@ -17702,14 +17702,14 @@
                       <a:r>
                         <a:rPr lang="en-US" sz="1400" dirty="0" smtClean="0">
                           <a:solidFill>
-                            <a:srgbClr val="FF0000"/>
+                            <a:schemeClr val="tx1"/>
                           </a:solidFill>
                         </a:rPr>
                         <a:t>$</a:t>
                       </a:r>
                       <a:endParaRPr lang="en-US" sz="1400" dirty="0">
                         <a:solidFill>
-                          <a:srgbClr val="FF0000"/>
+                          <a:schemeClr val="tx1"/>
                         </a:solidFill>
                       </a:endParaRPr>
                     </a:p>
@@ -19431,6 +19431,48 @@
           </a:graphicData>
         </a:graphic>
       </p:graphicFrame>
+      <p:cxnSp>
+        <p:nvCxnSpPr>
+          <p:cNvPr id="166" name="Curved Connector 165"/>
+          <p:cNvCxnSpPr>
+            <a:stCxn id="146" idx="1"/>
+            <a:endCxn id="116" idx="7"/>
+          </p:cNvCxnSpPr>
+          <p:nvPr/>
+        </p:nvCxnSpPr>
+        <p:spPr>
+          <a:xfrm rot="16200000" flipV="1">
+            <a:off x="4561352" y="-505685"/>
+            <a:ext cx="2352" cy="6185208"/>
+          </a:xfrm>
+          <a:prstGeom prst="curvedConnector3">
+            <a:avLst>
+              <a:gd name="adj1" fmla="val 28082908"/>
+            </a:avLst>
+          </a:prstGeom>
+          <a:ln w="12700">
+            <a:solidFill>
+              <a:schemeClr val="tx1"/>
+            </a:solidFill>
+            <a:tailEnd type="triangle" w="sm" len="sm"/>
+          </a:ln>
+          <a:effectLst/>
+        </p:spPr>
+        <p:style>
+          <a:lnRef idx="2">
+            <a:schemeClr val="accent1"/>
+          </a:lnRef>
+          <a:fillRef idx="0">
+            <a:schemeClr val="accent1"/>
+          </a:fillRef>
+          <a:effectRef idx="1">
+            <a:schemeClr val="accent1"/>
+          </a:effectRef>
+          <a:fontRef idx="minor">
+            <a:schemeClr val="tx1"/>
+          </a:fontRef>
+        </p:style>
+      </p:cxnSp>
     </p:spTree>
     <p:extLst>
       <p:ext uri="{BB962C8B-B14F-4D97-AF65-F5344CB8AC3E}">
@@ -21721,6 +21763,11 @@
               <a:rPr lang="en-US" dirty="0" smtClean="0"/>
               <a:t>One 4-bytes used to store </a:t>
             </a:r>
+            <a:r>
+              <a:rPr lang="en-US" dirty="0" smtClean="0"/>
+              <a:t>???.</a:t>
+            </a:r>
+            <a:endParaRPr lang="en-US" dirty="0" smtClean="0"/>
           </a:p>
           <a:p>
             <a:pPr lvl="1"/>

</xml_diff>

<commit_message>
Slightly redisigned GFM index to put length of GBWT, number of nodes, and size of eftab, which is not fixed in GBWT
</commit_message>
<xml_diff>
--- a/hisat2_test/GCSA_paper_example.pptx
+++ b/hisat2_test/GCSA_paper_example.pptx
@@ -9,6 +9,8 @@
     <p:sldId id="264" r:id="rId3"/>
     <p:sldId id="263" r:id="rId4"/>
     <p:sldId id="262" r:id="rId5"/>
+    <p:sldId id="265" r:id="rId6"/>
+    <p:sldId id="266" r:id="rId7"/>
   </p:sldIdLst>
   <p:sldSz cx="9144000" cy="6858000" type="screen4x3"/>
   <p:notesSz cx="6858000" cy="9144000"/>
@@ -29208,6 +29210,199 @@
 </p:sld>
 </file>
 
+<file path=ppt/slides/slide5.xml><?xml version="1.0" encoding="utf-8"?>
+<p:sld xmlns:a="http://schemas.openxmlformats.org/drawingml/2006/main" xmlns:r="http://schemas.openxmlformats.org/officeDocument/2006/relationships" xmlns:p="http://schemas.openxmlformats.org/presentationml/2006/main">
+  <p:cSld>
+    <p:spTree>
+      <p:nvGrpSpPr>
+        <p:cNvPr id="1" name=""/>
+        <p:cNvGrpSpPr/>
+        <p:nvPr/>
+      </p:nvGrpSpPr>
+      <p:grpSpPr>
+        <a:xfrm>
+          <a:off x="0" y="0"/>
+          <a:ext cx="0" cy="0"/>
+          <a:chOff x="0" y="0"/>
+          <a:chExt cx="0" cy="0"/>
+        </a:xfrm>
+      </p:grpSpPr>
+      <p:sp>
+        <p:nvSpPr>
+          <p:cNvPr id="2" name="Content Placeholder 1"/>
+          <p:cNvSpPr>
+            <a:spLocks noGrp="1"/>
+          </p:cNvSpPr>
+          <p:nvPr>
+            <p:ph idx="1"/>
+          </p:nvPr>
+        </p:nvSpPr>
+        <p:spPr/>
+        <p:txBody>
+          <a:bodyPr>
+            <a:normAutofit lnSpcReduction="10000"/>
+          </a:bodyPr>
+          <a:lstStyle/>
+          <a:p>
+            <a:r>
+              <a:rPr lang="en-US" dirty="0" smtClean="0"/>
+              <a:t>Out1 (GFM)</a:t>
+            </a:r>
+          </a:p>
+          <a:p>
+            <a:r>
+              <a:rPr lang="en-US" dirty="0" smtClean="0"/>
+              <a:t>Out2 (Offset)</a:t>
+            </a:r>
+          </a:p>
+          <a:p>
+            <a:r>
+              <a:rPr lang="en-US" dirty="0" smtClean="0"/>
+              <a:t>Out3 (???)</a:t>
+            </a:r>
+          </a:p>
+          <a:p>
+            <a:r>
+              <a:rPr lang="en-US" dirty="0" smtClean="0"/>
+              <a:t>Out4 (Ref. seq.)</a:t>
+            </a:r>
+          </a:p>
+          <a:p>
+            <a:r>
+              <a:rPr lang="en-US" dirty="0" smtClean="0"/>
+              <a:t>Out5 (Local GFMs)</a:t>
+            </a:r>
+          </a:p>
+          <a:p>
+            <a:r>
+              <a:rPr lang="en-US" dirty="0" smtClean="0"/>
+              <a:t>Out6 (Local offsets)</a:t>
+            </a:r>
+          </a:p>
+          <a:p>
+            <a:r>
+              <a:rPr lang="en-US" dirty="0" smtClean="0"/>
+              <a:t>Out7 (SNPs)</a:t>
+            </a:r>
+          </a:p>
+          <a:p>
+            <a:r>
+              <a:rPr lang="en-US" dirty="0" smtClean="0"/>
+              <a:t>Out8 (SNP IDs)</a:t>
+            </a:r>
+            <a:endParaRPr lang="en-US" dirty="0"/>
+          </a:p>
+        </p:txBody>
+      </p:sp>
+      <p:sp>
+        <p:nvSpPr>
+          <p:cNvPr id="10" name="Title 1"/>
+          <p:cNvSpPr>
+            <a:spLocks noGrp="1"/>
+          </p:cNvSpPr>
+          <p:nvPr>
+            <p:ph type="title"/>
+          </p:nvPr>
+        </p:nvSpPr>
+        <p:spPr>
+          <a:xfrm>
+            <a:off x="457200" y="274638"/>
+            <a:ext cx="8229600" cy="1143000"/>
+          </a:xfrm>
+        </p:spPr>
+        <p:txBody>
+          <a:bodyPr/>
+          <a:lstStyle/>
+          <a:p>
+            <a:r>
+              <a:rPr lang="en-US" dirty="0" smtClean="0"/>
+              <a:t>HISAT2 index files</a:t>
+            </a:r>
+            <a:endParaRPr lang="en-US" dirty="0"/>
+          </a:p>
+        </p:txBody>
+      </p:sp>
+    </p:spTree>
+    <p:extLst>
+      <p:ext uri="{BB962C8B-B14F-4D97-AF65-F5344CB8AC3E}">
+        <p14:creationId xmlns:p14="http://schemas.microsoft.com/office/powerpoint/2010/main" val="698994913"/>
+      </p:ext>
+    </p:extLst>
+  </p:cSld>
+  <p:clrMapOvr>
+    <a:masterClrMapping/>
+  </p:clrMapOvr>
+</p:sld>
+</file>
+
+<file path=ppt/slides/slide6.xml><?xml version="1.0" encoding="utf-8"?>
+<p:sld xmlns:a="http://schemas.openxmlformats.org/drawingml/2006/main" xmlns:r="http://schemas.openxmlformats.org/officeDocument/2006/relationships" xmlns:p="http://schemas.openxmlformats.org/presentationml/2006/main">
+  <p:cSld>
+    <p:spTree>
+      <p:nvGrpSpPr>
+        <p:cNvPr id="1" name=""/>
+        <p:cNvGrpSpPr/>
+        <p:nvPr/>
+      </p:nvGrpSpPr>
+      <p:grpSpPr>
+        <a:xfrm>
+          <a:off x="0" y="0"/>
+          <a:ext cx="0" cy="0"/>
+          <a:chOff x="0" y="0"/>
+          <a:chExt cx="0" cy="0"/>
+        </a:xfrm>
+      </p:grpSpPr>
+      <p:sp>
+        <p:nvSpPr>
+          <p:cNvPr id="2" name="Title 1"/>
+          <p:cNvSpPr>
+            <a:spLocks noGrp="1"/>
+          </p:cNvSpPr>
+          <p:nvPr>
+            <p:ph type="title"/>
+          </p:nvPr>
+        </p:nvSpPr>
+        <p:spPr/>
+        <p:txBody>
+          <a:bodyPr/>
+          <a:lstStyle/>
+          <a:p>
+            <a:endParaRPr lang="en-US"/>
+          </a:p>
+        </p:txBody>
+      </p:sp>
+      <p:sp>
+        <p:nvSpPr>
+          <p:cNvPr id="3" name="Content Placeholder 2"/>
+          <p:cNvSpPr>
+            <a:spLocks noGrp="1"/>
+          </p:cNvSpPr>
+          <p:nvPr>
+            <p:ph idx="1"/>
+          </p:nvPr>
+        </p:nvSpPr>
+        <p:spPr/>
+        <p:txBody>
+          <a:bodyPr/>
+          <a:lstStyle/>
+          <a:p>
+            <a:endParaRPr lang="en-US"/>
+          </a:p>
+        </p:txBody>
+      </p:sp>
+    </p:spTree>
+    <p:extLst>
+      <p:ext uri="{BB962C8B-B14F-4D97-AF65-F5344CB8AC3E}">
+        <p14:creationId xmlns:p14="http://schemas.microsoft.com/office/powerpoint/2010/main" val="3688186388"/>
+      </p:ext>
+    </p:extLst>
+  </p:cSld>
+  <p:clrMapOvr>
+    <a:masterClrMapping/>
+  </p:clrMapOvr>
+</p:sld>
+</file>
+
 <file path=ppt/theme/theme1.xml><?xml version="1.0" encoding="utf-8"?>
 <a:theme xmlns:a="http://schemas.openxmlformats.org/drawingml/2006/main" name="Office Theme">
   <a:themeElements>

</xml_diff>

<commit_message>
Created [78].ht2 files to store SNPs
</commit_message>
<xml_diff>
--- a/hisat2_test/GCSA_paper_example.pptx
+++ b/hisat2_test/GCSA_paper_example.pptx
@@ -10,7 +10,6 @@
     <p:sldId id="263" r:id="rId4"/>
     <p:sldId id="262" r:id="rId5"/>
     <p:sldId id="265" r:id="rId6"/>
-    <p:sldId id="266" r:id="rId7"/>
   </p:sldIdLst>
   <p:sldSz cx="9144000" cy="6858000" type="screen4x3"/>
   <p:notesSz cx="6858000" cy="9144000"/>
@@ -29240,13 +29239,20 @@
         <p:spPr/>
         <p:txBody>
           <a:bodyPr>
-            <a:normAutofit lnSpcReduction="10000"/>
+            <a:normAutofit fontScale="92500" lnSpcReduction="10000"/>
           </a:bodyPr>
           <a:lstStyle/>
           <a:p>
             <a:r>
               <a:rPr lang="en-US" dirty="0" smtClean="0"/>
               <a:t>Out1 (GFM)</a:t>
+            </a:r>
+          </a:p>
+          <a:p>
+            <a:pPr lvl="1"/>
+            <a:r>
+              <a:rPr lang="en-US" dirty="0" smtClean="0"/>
+              <a:t>Ref. names written at the end</a:t>
             </a:r>
           </a:p>
           <a:p>
@@ -29258,7 +29264,7 @@
           <a:p>
             <a:r>
               <a:rPr lang="en-US" dirty="0" smtClean="0"/>
-              <a:t>Out3 (???)</a:t>
+              <a:t>Out3 (Ref. seq. contig information)</a:t>
             </a:r>
           </a:p>
           <a:p>
@@ -29326,74 +29332,6 @@
     <p:extLst>
       <p:ext uri="{BB962C8B-B14F-4D97-AF65-F5344CB8AC3E}">
         <p14:creationId xmlns:p14="http://schemas.microsoft.com/office/powerpoint/2010/main" val="698994913"/>
-      </p:ext>
-    </p:extLst>
-  </p:cSld>
-  <p:clrMapOvr>
-    <a:masterClrMapping/>
-  </p:clrMapOvr>
-</p:sld>
-</file>
-
-<file path=ppt/slides/slide6.xml><?xml version="1.0" encoding="utf-8"?>
-<p:sld xmlns:a="http://schemas.openxmlformats.org/drawingml/2006/main" xmlns:r="http://schemas.openxmlformats.org/officeDocument/2006/relationships" xmlns:p="http://schemas.openxmlformats.org/presentationml/2006/main">
-  <p:cSld>
-    <p:spTree>
-      <p:nvGrpSpPr>
-        <p:cNvPr id="1" name=""/>
-        <p:cNvGrpSpPr/>
-        <p:nvPr/>
-      </p:nvGrpSpPr>
-      <p:grpSpPr>
-        <a:xfrm>
-          <a:off x="0" y="0"/>
-          <a:ext cx="0" cy="0"/>
-          <a:chOff x="0" y="0"/>
-          <a:chExt cx="0" cy="0"/>
-        </a:xfrm>
-      </p:grpSpPr>
-      <p:sp>
-        <p:nvSpPr>
-          <p:cNvPr id="2" name="Title 1"/>
-          <p:cNvSpPr>
-            <a:spLocks noGrp="1"/>
-          </p:cNvSpPr>
-          <p:nvPr>
-            <p:ph type="title"/>
-          </p:nvPr>
-        </p:nvSpPr>
-        <p:spPr/>
-        <p:txBody>
-          <a:bodyPr/>
-          <a:lstStyle/>
-          <a:p>
-            <a:endParaRPr lang="en-US"/>
-          </a:p>
-        </p:txBody>
-      </p:sp>
-      <p:sp>
-        <p:nvSpPr>
-          <p:cNvPr id="3" name="Content Placeholder 2"/>
-          <p:cNvSpPr>
-            <a:spLocks noGrp="1"/>
-          </p:cNvSpPr>
-          <p:nvPr>
-            <p:ph idx="1"/>
-          </p:nvPr>
-        </p:nvSpPr>
-        <p:spPr/>
-        <p:txBody>
-          <a:bodyPr/>
-          <a:lstStyle/>
-          <a:p>
-            <a:endParaRPr lang="en-US"/>
-          </a:p>
-        </p:txBody>
-      </p:sp>
-    </p:spTree>
-    <p:extLst>
-      <p:ext uri="{BB962C8B-B14F-4D97-AF65-F5344CB8AC3E}">
-        <p14:creationId xmlns:p14="http://schemas.microsoft.com/office/powerpoint/2010/main" val="3688186388"/>
       </p:ext>
     </p:extLst>
   </p:cSld>

</xml_diff>

<commit_message>
A couple of assertion fixes and change hisat-related names to hisat2
</commit_message>
<xml_diff>
--- a/hisat2_test/GCSA_paper_example.pptx
+++ b/hisat2_test/GCSA_paper_example.pptx
@@ -10,6 +10,7 @@
     <p:sldId id="263" r:id="rId4"/>
     <p:sldId id="262" r:id="rId5"/>
     <p:sldId id="265" r:id="rId6"/>
+    <p:sldId id="266" r:id="rId7"/>
   </p:sldIdLst>
   <p:sldSz cx="9144000" cy="6858000" type="screen4x3"/>
   <p:notesSz cx="6858000" cy="9144000"/>
@@ -292,7 +293,7 @@
           <a:p>
             <a:fld id="{FA0EBC18-7907-1F45-BE8D-CA697DC3E666}" type="datetimeFigureOut">
               <a:rPr lang="en-US" smtClean="0"/>
-              <a:t>5/30/15</a:t>
+              <a:t>6/16/15</a:t>
             </a:fld>
             <a:endParaRPr lang="en-US"/>
           </a:p>
@@ -462,7 +463,7 @@
           <a:p>
             <a:fld id="{FA0EBC18-7907-1F45-BE8D-CA697DC3E666}" type="datetimeFigureOut">
               <a:rPr lang="en-US" smtClean="0"/>
-              <a:t>5/30/15</a:t>
+              <a:t>6/16/15</a:t>
             </a:fld>
             <a:endParaRPr lang="en-US"/>
           </a:p>
@@ -642,7 +643,7 @@
           <a:p>
             <a:fld id="{FA0EBC18-7907-1F45-BE8D-CA697DC3E666}" type="datetimeFigureOut">
               <a:rPr lang="en-US" smtClean="0"/>
-              <a:t>5/30/15</a:t>
+              <a:t>6/16/15</a:t>
             </a:fld>
             <a:endParaRPr lang="en-US"/>
           </a:p>
@@ -812,7 +813,7 @@
           <a:p>
             <a:fld id="{FA0EBC18-7907-1F45-BE8D-CA697DC3E666}" type="datetimeFigureOut">
               <a:rPr lang="en-US" smtClean="0"/>
-              <a:t>5/30/15</a:t>
+              <a:t>6/16/15</a:t>
             </a:fld>
             <a:endParaRPr lang="en-US"/>
           </a:p>
@@ -1058,7 +1059,7 @@
           <a:p>
             <a:fld id="{FA0EBC18-7907-1F45-BE8D-CA697DC3E666}" type="datetimeFigureOut">
               <a:rPr lang="en-US" smtClean="0"/>
-              <a:t>5/30/15</a:t>
+              <a:t>6/16/15</a:t>
             </a:fld>
             <a:endParaRPr lang="en-US"/>
           </a:p>
@@ -1346,7 +1347,7 @@
           <a:p>
             <a:fld id="{FA0EBC18-7907-1F45-BE8D-CA697DC3E666}" type="datetimeFigureOut">
               <a:rPr lang="en-US" smtClean="0"/>
-              <a:t>5/30/15</a:t>
+              <a:t>6/16/15</a:t>
             </a:fld>
             <a:endParaRPr lang="en-US"/>
           </a:p>
@@ -1768,7 +1769,7 @@
           <a:p>
             <a:fld id="{FA0EBC18-7907-1F45-BE8D-CA697DC3E666}" type="datetimeFigureOut">
               <a:rPr lang="en-US" smtClean="0"/>
-              <a:t>5/30/15</a:t>
+              <a:t>6/16/15</a:t>
             </a:fld>
             <a:endParaRPr lang="en-US"/>
           </a:p>
@@ -1886,7 +1887,7 @@
           <a:p>
             <a:fld id="{FA0EBC18-7907-1F45-BE8D-CA697DC3E666}" type="datetimeFigureOut">
               <a:rPr lang="en-US" smtClean="0"/>
-              <a:t>5/30/15</a:t>
+              <a:t>6/16/15</a:t>
             </a:fld>
             <a:endParaRPr lang="en-US"/>
           </a:p>
@@ -1981,7 +1982,7 @@
           <a:p>
             <a:fld id="{FA0EBC18-7907-1F45-BE8D-CA697DC3E666}" type="datetimeFigureOut">
               <a:rPr lang="en-US" smtClean="0"/>
-              <a:t>5/30/15</a:t>
+              <a:t>6/16/15</a:t>
             </a:fld>
             <a:endParaRPr lang="en-US"/>
           </a:p>
@@ -2258,7 +2259,7 @@
           <a:p>
             <a:fld id="{FA0EBC18-7907-1F45-BE8D-CA697DC3E666}" type="datetimeFigureOut">
               <a:rPr lang="en-US" smtClean="0"/>
-              <a:t>5/30/15</a:t>
+              <a:t>6/16/15</a:t>
             </a:fld>
             <a:endParaRPr lang="en-US"/>
           </a:p>
@@ -2511,7 +2512,7 @@
           <a:p>
             <a:fld id="{FA0EBC18-7907-1F45-BE8D-CA697DC3E666}" type="datetimeFigureOut">
               <a:rPr lang="en-US" smtClean="0"/>
-              <a:t>5/30/15</a:t>
+              <a:t>6/16/15</a:t>
             </a:fld>
             <a:endParaRPr lang="en-US"/>
           </a:p>
@@ -2724,7 +2725,7 @@
           <a:p>
             <a:fld id="{FA0EBC18-7907-1F45-BE8D-CA697DC3E666}" type="datetimeFigureOut">
               <a:rPr lang="en-US" smtClean="0"/>
-              <a:t>5/30/15</a:t>
+              <a:t>6/16/15</a:t>
             </a:fld>
             <a:endParaRPr lang="en-US"/>
           </a:p>
@@ -7478,11 +7479,6 @@
               </a:rPr>
               <a:t>12</a:t>
             </a:r>
-            <a:endParaRPr lang="en-US" altLang="ko-KR" sz="1000" dirty="0" smtClean="0">
-              <a:solidFill>
-                <a:srgbClr val="0000FF"/>
-              </a:solidFill>
-            </a:endParaRPr>
           </a:p>
         </p:txBody>
       </p:sp>
@@ -7516,11 +7512,6 @@
               </a:rPr>
               <a:t>9</a:t>
             </a:r>
-            <a:endParaRPr lang="en-US" altLang="ko-KR" sz="1000" dirty="0" smtClean="0">
-              <a:solidFill>
-                <a:srgbClr val="0000FF"/>
-              </a:solidFill>
-            </a:endParaRPr>
           </a:p>
         </p:txBody>
       </p:sp>
@@ -7554,11 +7545,6 @@
               </a:rPr>
               <a:t>14</a:t>
             </a:r>
-            <a:endParaRPr lang="en-US" altLang="ko-KR" sz="1000" dirty="0" smtClean="0">
-              <a:solidFill>
-                <a:srgbClr val="0000FF"/>
-              </a:solidFill>
-            </a:endParaRPr>
           </a:p>
         </p:txBody>
       </p:sp>
@@ -7592,11 +7578,6 @@
               </a:rPr>
               <a:t>11</a:t>
             </a:r>
-            <a:endParaRPr lang="en-US" altLang="ko-KR" sz="1000" dirty="0" smtClean="0">
-              <a:solidFill>
-                <a:srgbClr val="0000FF"/>
-              </a:solidFill>
-            </a:endParaRPr>
           </a:p>
         </p:txBody>
       </p:sp>
@@ -10962,15 +10943,7 @@
                   <a:srgbClr val="660066"/>
                 </a:solidFill>
               </a:rPr>
-              <a:t>A(CTG|</a:t>
-            </a:r>
-            <a:r>
-              <a:rPr lang="en-US" sz="1000" dirty="0" smtClean="0">
-                <a:solidFill>
-                  <a:srgbClr val="660066"/>
-                </a:solidFill>
-              </a:rPr>
-              <a:t>GZ)</a:t>
+              <a:t>A(CTG|GZ)</a:t>
             </a:r>
             <a:endParaRPr lang="en-US" sz="1000" dirty="0">
               <a:solidFill>
@@ -15093,11 +15066,6 @@
               </a:rPr>
               <a:t>12</a:t>
             </a:r>
-            <a:endParaRPr lang="en-US" altLang="ko-KR" sz="1000" dirty="0" smtClean="0">
-              <a:solidFill>
-                <a:srgbClr val="0000FF"/>
-              </a:solidFill>
-            </a:endParaRPr>
           </a:p>
         </p:txBody>
       </p:sp>
@@ -15131,11 +15099,6 @@
               </a:rPr>
               <a:t>9</a:t>
             </a:r>
-            <a:endParaRPr lang="en-US" altLang="ko-KR" sz="1000" dirty="0" smtClean="0">
-              <a:solidFill>
-                <a:srgbClr val="0000FF"/>
-              </a:solidFill>
-            </a:endParaRPr>
           </a:p>
         </p:txBody>
       </p:sp>
@@ -15169,11 +15132,6 @@
               </a:rPr>
               <a:t>13</a:t>
             </a:r>
-            <a:endParaRPr lang="en-US" altLang="ko-KR" sz="1000" dirty="0" smtClean="0">
-              <a:solidFill>
-                <a:srgbClr val="0000FF"/>
-              </a:solidFill>
-            </a:endParaRPr>
           </a:p>
         </p:txBody>
       </p:sp>
@@ -15207,11 +15165,6 @@
               </a:rPr>
               <a:t>11</a:t>
             </a:r>
-            <a:endParaRPr lang="en-US" altLang="ko-KR" sz="1000" dirty="0" smtClean="0">
-              <a:solidFill>
-                <a:srgbClr val="0000FF"/>
-              </a:solidFill>
-            </a:endParaRPr>
           </a:p>
         </p:txBody>
       </p:sp>
@@ -19421,15 +19374,7 @@
                   <a:srgbClr val="660066"/>
                 </a:solidFill>
               </a:rPr>
-              <a:t>A(CTG|</a:t>
-            </a:r>
-            <a:r>
-              <a:rPr lang="en-US" sz="1000" dirty="0" smtClean="0">
-                <a:solidFill>
-                  <a:srgbClr val="660066"/>
-                </a:solidFill>
-              </a:rPr>
-              <a:t>GZ)</a:t>
+              <a:t>A(CTG|GZ)</a:t>
             </a:r>
             <a:endParaRPr lang="en-US" sz="1000" dirty="0">
               <a:solidFill>
@@ -29341,6 +29286,157 @@
 </p:sld>
 </file>
 
+<file path=ppt/slides/slide6.xml><?xml version="1.0" encoding="utf-8"?>
+<p:sld xmlns:a="http://schemas.openxmlformats.org/drawingml/2006/main" xmlns:r="http://schemas.openxmlformats.org/officeDocument/2006/relationships" xmlns:p="http://schemas.openxmlformats.org/presentationml/2006/main">
+  <p:cSld>
+    <p:spTree>
+      <p:nvGrpSpPr>
+        <p:cNvPr id="1" name=""/>
+        <p:cNvGrpSpPr/>
+        <p:nvPr/>
+      </p:nvGrpSpPr>
+      <p:grpSpPr>
+        <a:xfrm>
+          <a:off x="0" y="0"/>
+          <a:ext cx="0" cy="0"/>
+          <a:chOff x="0" y="0"/>
+          <a:chExt cx="0" cy="0"/>
+        </a:xfrm>
+      </p:grpSpPr>
+      <p:sp>
+        <p:nvSpPr>
+          <p:cNvPr id="2" name="Title 1"/>
+          <p:cNvSpPr>
+            <a:spLocks noGrp="1"/>
+          </p:cNvSpPr>
+          <p:nvPr>
+            <p:ph type="title"/>
+          </p:nvPr>
+        </p:nvSpPr>
+        <p:spPr/>
+        <p:txBody>
+          <a:bodyPr/>
+          <a:lstStyle/>
+          <a:p>
+            <a:endParaRPr lang="en-US"/>
+          </a:p>
+        </p:txBody>
+      </p:sp>
+      <p:sp>
+        <p:nvSpPr>
+          <p:cNvPr id="3" name="Content Placeholder 2"/>
+          <p:cNvSpPr>
+            <a:spLocks noGrp="1"/>
+          </p:cNvSpPr>
+          <p:nvPr>
+            <p:ph idx="1"/>
+          </p:nvPr>
+        </p:nvSpPr>
+        <p:spPr/>
+        <p:txBody>
+          <a:bodyPr/>
+          <a:lstStyle/>
+          <a:p>
+            <a:r>
+              <a:rPr lang="en-US" dirty="0" smtClean="0"/>
+              <a:t>Igm4, -p 4, 273GB, 5 hours 33 minutes</a:t>
+            </a:r>
+          </a:p>
+          <a:p>
+            <a:r>
+              <a:rPr lang="en-US" dirty="0" smtClean="0"/>
+              <a:t>Index size: 6.2GB, Memory usage: 6.9GB</a:t>
+            </a:r>
+          </a:p>
+          <a:p>
+            <a:r>
+              <a:rPr lang="en-US" dirty="0"/>
+              <a:t>Number of nodes: </a:t>
+            </a:r>
+            <a:r>
+              <a:rPr lang="en-US" dirty="0" smtClean="0"/>
+              <a:t>3,153,850,525</a:t>
+            </a:r>
+          </a:p>
+          <a:p>
+            <a:r>
+              <a:rPr lang="en-US" dirty="0" smtClean="0"/>
+              <a:t>Number of edges </a:t>
+            </a:r>
+            <a:r>
+              <a:rPr lang="en-US" dirty="0"/>
+              <a:t>(GBWTs): </a:t>
+            </a:r>
+            <a:r>
+              <a:rPr lang="en-US" dirty="0" smtClean="0"/>
+              <a:t>3,166,831,929</a:t>
+            </a:r>
+          </a:p>
+          <a:p>
+            <a:r>
+              <a:rPr lang="en-US" dirty="0"/>
+              <a:t>Number of SNPs: </a:t>
+            </a:r>
+            <a:r>
+              <a:rPr lang="en-US" dirty="0" smtClean="0"/>
+              <a:t>12,360,648</a:t>
+            </a:r>
+          </a:p>
+          <a:p>
+            <a:pPr lvl="1"/>
+            <a:r>
+              <a:rPr lang="en-US" dirty="0"/>
+              <a:t>Single: </a:t>
+            </a:r>
+            <a:r>
+              <a:rPr lang="en-US" dirty="0" smtClean="0"/>
+              <a:t>11,076,904</a:t>
+            </a:r>
+          </a:p>
+          <a:p>
+            <a:pPr lvl="1"/>
+            <a:r>
+              <a:rPr lang="en-US" dirty="0" smtClean="0"/>
+              <a:t>Deletion</a:t>
+            </a:r>
+            <a:r>
+              <a:rPr lang="en-US" dirty="0"/>
+              <a:t>: </a:t>
+            </a:r>
+            <a:r>
+              <a:rPr lang="en-US" dirty="0" smtClean="0"/>
+              <a:t>728,145</a:t>
+            </a:r>
+          </a:p>
+          <a:p>
+            <a:pPr lvl="1"/>
+            <a:r>
+              <a:rPr lang="en-US" dirty="0"/>
+              <a:t>Insertion: </a:t>
+            </a:r>
+            <a:r>
+              <a:rPr lang="en-US" dirty="0" smtClean="0"/>
+              <a:t>555,599</a:t>
+            </a:r>
+          </a:p>
+          <a:p>
+            <a:endParaRPr lang="en-US" dirty="0"/>
+          </a:p>
+        </p:txBody>
+      </p:sp>
+    </p:spTree>
+    <p:extLst>
+      <p:ext uri="{BB962C8B-B14F-4D97-AF65-F5344CB8AC3E}">
+        <p14:creationId xmlns:p14="http://schemas.microsoft.com/office/powerpoint/2010/main" val="556253751"/>
+      </p:ext>
+    </p:extLst>
+  </p:cSld>
+  <p:clrMapOvr>
+    <a:masterClrMapping/>
+  </p:clrMapOvr>
+</p:sld>
+</file>
+
 <file path=ppt/theme/theme1.xml><?xml version="1.0" encoding="utf-8"?>
 <a:theme xmlns:a="http://schemas.openxmlformats.org/drawingml/2006/main" name="Office Theme">
   <a:themeElements>

</xml_diff>